<commit_message>
Updated slide opening and minor corrections
</commit_message>
<xml_diff>
--- a/slides/re4ai/seminar-refun-re4ai.pptx
+++ b/slides/re4ai/seminar-refun-re4ai.pptx
@@ -205,7 +205,7 @@
           <a:p>
             <a:fld id="{DDEAE774-A069-4C80-913C-6311167CE991}" type="datetimeFigureOut">
               <a:rPr lang="en-SE" smtClean="0"/>
-              <a:t>2025-06-10</a:t>
+              <a:t>2025-06-11</a:t>
             </a:fld>
             <a:endParaRPr lang="en-SE"/>
           </a:p>
@@ -1437,7 +1437,7 @@
           <a:p>
             <a:fld id="{B8A2E2F5-1ACA-471C-8F75-D4BCA16AD5E4}" type="datetime1">
               <a:rPr lang="de-DE" smtClean="0"/>
-              <a:t>10.06.2025</a:t>
+              <a:t>11.06.2025</a:t>
             </a:fld>
             <a:endParaRPr lang="en-SE"/>
           </a:p>
@@ -1641,7 +1641,7 @@
           <a:p>
             <a:fld id="{9CE85F0D-3621-49AF-AC39-8AC23685A06D}" type="datetime1">
               <a:rPr lang="de-DE" smtClean="0"/>
-              <a:t>10.06.2025</a:t>
+              <a:t>11.06.2025</a:t>
             </a:fld>
             <a:endParaRPr lang="en-SE"/>
           </a:p>
@@ -1855,7 +1855,7 @@
           <a:p>
             <a:fld id="{160A867D-26C0-4BE6-AD28-8E577999D0AD}" type="datetime1">
               <a:rPr lang="de-DE" smtClean="0"/>
-              <a:t>10.06.2025</a:t>
+              <a:t>11.06.2025</a:t>
             </a:fld>
             <a:endParaRPr lang="en-SE"/>
           </a:p>
@@ -2059,7 +2059,7 @@
           <a:p>
             <a:fld id="{60CB520D-D965-46BA-A3CC-319C6DE058D5}" type="datetime1">
               <a:rPr lang="de-DE" smtClean="0"/>
-              <a:t>10.06.2025</a:t>
+              <a:t>11.06.2025</a:t>
             </a:fld>
             <a:endParaRPr lang="en-SE"/>
           </a:p>
@@ -2375,7 +2375,7 @@
           <a:p>
             <a:fld id="{31641F1E-B483-4EB3-9802-4CF7B641DA50}" type="datetime1">
               <a:rPr lang="de-DE" smtClean="0"/>
-              <a:t>10.06.2025</a:t>
+              <a:t>11.06.2025</a:t>
             </a:fld>
             <a:endParaRPr lang="en-SE"/>
           </a:p>
@@ -2647,7 +2647,7 @@
           <a:p>
             <a:fld id="{A2D09C0C-D3BA-4ECB-A545-CDA3562F5566}" type="datetime1">
               <a:rPr lang="de-DE" smtClean="0"/>
-              <a:t>10.06.2025</a:t>
+              <a:t>11.06.2025</a:t>
             </a:fld>
             <a:endParaRPr lang="en-SE"/>
           </a:p>
@@ -3066,7 +3066,7 @@
           <a:p>
             <a:fld id="{444B75DF-1FF5-4129-9D05-47C75362EC53}" type="datetime1">
               <a:rPr lang="de-DE" smtClean="0"/>
-              <a:t>10.06.2025</a:t>
+              <a:t>11.06.2025</a:t>
             </a:fld>
             <a:endParaRPr lang="en-SE"/>
           </a:p>
@@ -3212,7 +3212,7 @@
           <a:p>
             <a:fld id="{0F6BB554-CBE8-420E-8DB3-328AA6ED9152}" type="datetime1">
               <a:rPr lang="de-DE" smtClean="0"/>
-              <a:t>10.06.2025</a:t>
+              <a:t>11.06.2025</a:t>
             </a:fld>
             <a:endParaRPr lang="en-SE"/>
           </a:p>
@@ -3329,7 +3329,7 @@
           <a:p>
             <a:fld id="{4E741018-AF8E-4242-8324-D95ED1F238A9}" type="datetime1">
               <a:rPr lang="de-DE" smtClean="0"/>
-              <a:t>10.06.2025</a:t>
+              <a:t>11.06.2025</a:t>
             </a:fld>
             <a:endParaRPr lang="en-SE"/>
           </a:p>
@@ -3646,7 +3646,7 @@
           <a:p>
             <a:fld id="{AA1D58F1-E3F8-4B02-943D-561FC8CA65DA}" type="datetime1">
               <a:rPr lang="de-DE" smtClean="0"/>
-              <a:t>10.06.2025</a:t>
+              <a:t>11.06.2025</a:t>
             </a:fld>
             <a:endParaRPr lang="en-SE"/>
           </a:p>
@@ -3939,7 +3939,7 @@
           <a:p>
             <a:fld id="{30B31B0D-1915-42B5-9F14-EA9B347BDDFB}" type="datetime1">
               <a:rPr lang="de-DE" smtClean="0"/>
-              <a:t>10.06.2025</a:t>
+              <a:t>11.06.2025</a:t>
             </a:fld>
             <a:endParaRPr lang="en-SE"/>
           </a:p>
@@ -4186,7 +4186,7 @@
           <a:p>
             <a:fld id="{C201C510-583C-41D6-8FD1-574D99E0A72F}" type="datetime1">
               <a:rPr lang="de-DE" smtClean="0"/>
-              <a:t>10.06.2025</a:t>
+              <a:t>11.06.2025</a:t>
             </a:fld>
             <a:endParaRPr lang="en-SE"/>
           </a:p>
@@ -4688,8 +4688,8 @@
         </p:nvSpPr>
         <p:spPr>
           <a:xfrm>
-            <a:off x="7326064" y="5859885"/>
-            <a:ext cx="4175374" cy="523220"/>
+            <a:off x="8077038" y="5859885"/>
+            <a:ext cx="3424400" cy="523220"/>
           </a:xfrm>
           <a:prstGeom prst="rect">
             <a:avLst/>
@@ -4712,18 +4712,15 @@
             <a:pPr algn="r"/>
             <a:r>
               <a:rPr lang="en-US" sz="1400" dirty="0"/>
-              <a:t>This work is licensed under the </a:t>
+              <a:t>This work is licensed under </a:t>
             </a:r>
             <a:r>
               <a:rPr lang="en-US" sz="1400" dirty="0">
                 <a:hlinkClick r:id="rId2"/>
               </a:rPr>
-              <a:t>Apache-2.0</a:t>
+              <a:t>CC BY-NC 4.0</a:t>
             </a:r>
-            <a:r>
-              <a:rPr lang="en-US" sz="1400" dirty="0"/>
-              <a:t> License.</a:t>
-            </a:r>
+            <a:endParaRPr lang="en-US" sz="1400" dirty="0"/>
           </a:p>
         </p:txBody>
       </p:sp>
@@ -5153,13 +5150,13 @@
   <p:clrMapOvr>
     <a:masterClrMapping/>
   </p:clrMapOvr>
-  <mc:AlternateContent xmlns:mc="http://schemas.openxmlformats.org/markup-compatibility/2006">
-    <mc:Choice xmlns:p159="http://schemas.microsoft.com/office/powerpoint/2015/09/main" Requires="p159">
+  <mc:AlternateContent xmlns:mc="http://schemas.openxmlformats.org/markup-compatibility/2006" xmlns:p159="http://schemas.microsoft.com/office/powerpoint/2015/09/main">
+    <mc:Choice Requires="p159">
       <p:transition xmlns:p14="http://schemas.microsoft.com/office/powerpoint/2010/main" spd="med" p14:dur="700">
         <p159:morph option="byObject"/>
       </p:transition>
     </mc:Choice>
-    <mc:Fallback>
+    <mc:Fallback xmlns="">
       <p:transition spd="med">
         <p:fade/>
       </p:transition>
@@ -5274,7 +5271,7 @@
           <a:p>
             <a:fld id="{D38D8326-7627-4205-9A5F-95F3F1040FEF}" type="datetime1">
               <a:rPr lang="de-DE" smtClean="0"/>
-              <a:t>10.06.2025</a:t>
+              <a:t>11.06.2025</a:t>
             </a:fld>
             <a:endParaRPr lang="en-SE"/>
           </a:p>
@@ -5550,13 +5547,13 @@
   <p:clrMapOvr>
     <a:masterClrMapping/>
   </p:clrMapOvr>
-  <mc:AlternateContent xmlns:mc="http://schemas.openxmlformats.org/markup-compatibility/2006">
-    <mc:Choice xmlns:p159="http://schemas.microsoft.com/office/powerpoint/2015/09/main" Requires="p159">
+  <mc:AlternateContent xmlns:mc="http://schemas.openxmlformats.org/markup-compatibility/2006" xmlns:p159="http://schemas.microsoft.com/office/powerpoint/2015/09/main">
+    <mc:Choice Requires="p159">
       <p:transition xmlns:p14="http://schemas.microsoft.com/office/powerpoint/2010/main" spd="med" p14:dur="700">
         <p159:morph option="byObject"/>
       </p:transition>
     </mc:Choice>
-    <mc:Fallback>
+    <mc:Fallback xmlns="">
       <p:transition spd="med">
         <p:fade/>
       </p:transition>
@@ -5853,7 +5850,7 @@
           <a:p>
             <a:fld id="{321B4E5B-B554-4A4E-9AFC-494CA4AB5039}" type="datetime1">
               <a:rPr lang="de-DE" smtClean="0"/>
-              <a:t>10.06.2025</a:t>
+              <a:t>11.06.2025</a:t>
             </a:fld>
             <a:endParaRPr lang="en-SE"/>
           </a:p>
@@ -6860,13 +6857,13 @@
   <p:clrMapOvr>
     <a:masterClrMapping/>
   </p:clrMapOvr>
-  <mc:AlternateContent xmlns:mc="http://schemas.openxmlformats.org/markup-compatibility/2006">
-    <mc:Choice xmlns:p159="http://schemas.microsoft.com/office/powerpoint/2015/09/main" Requires="p159">
+  <mc:AlternateContent xmlns:mc="http://schemas.openxmlformats.org/markup-compatibility/2006" xmlns:p159="http://schemas.microsoft.com/office/powerpoint/2015/09/main">
+    <mc:Choice Requires="p159">
       <p:transition xmlns:p14="http://schemas.microsoft.com/office/powerpoint/2010/main" spd="med" p14:dur="700">
         <p159:morph option="byObject"/>
       </p:transition>
     </mc:Choice>
-    <mc:Fallback>
+    <mc:Fallback xmlns="">
       <p:transition spd="med">
         <p:fade/>
       </p:transition>
@@ -7352,7 +7349,7 @@
           <a:p>
             <a:fld id="{98B9F68E-FC76-42D5-B844-A85C731BB18C}" type="datetime1">
               <a:rPr lang="de-DE" smtClean="0"/>
-              <a:t>10.06.2025</a:t>
+              <a:t>11.06.2025</a:t>
             </a:fld>
             <a:endParaRPr lang="en-SE"/>
           </a:p>
@@ -7911,13 +7908,13 @@
   <p:clrMapOvr>
     <a:masterClrMapping/>
   </p:clrMapOvr>
-  <mc:AlternateContent xmlns:mc="http://schemas.openxmlformats.org/markup-compatibility/2006">
-    <mc:Choice xmlns:p159="http://schemas.microsoft.com/office/powerpoint/2015/09/main" Requires="p159">
+  <mc:AlternateContent xmlns:mc="http://schemas.openxmlformats.org/markup-compatibility/2006" xmlns:p159="http://schemas.microsoft.com/office/powerpoint/2015/09/main">
+    <mc:Choice Requires="p159">
       <p:transition xmlns:p14="http://schemas.microsoft.com/office/powerpoint/2010/main" spd="med" p14:dur="700">
         <p159:morph option="byObject"/>
       </p:transition>
     </mc:Choice>
-    <mc:Fallback>
+    <mc:Fallback xmlns="">
       <p:transition spd="med">
         <p:fade/>
       </p:transition>
@@ -8290,7 +8287,7 @@
           <a:p>
             <a:fld id="{60CB520D-D965-46BA-A3CC-319C6DE058D5}" type="datetime1">
               <a:rPr lang="de-DE" smtClean="0"/>
-              <a:t>10.06.2025</a:t>
+              <a:t>11.06.2025</a:t>
             </a:fld>
             <a:endParaRPr lang="en-SE"/>
           </a:p>
@@ -9934,13 +9931,13 @@
   <p:clrMapOvr>
     <a:masterClrMapping/>
   </p:clrMapOvr>
-  <mc:AlternateContent xmlns:mc="http://schemas.openxmlformats.org/markup-compatibility/2006">
-    <mc:Choice xmlns:p159="http://schemas.microsoft.com/office/powerpoint/2015/09/main" Requires="p159">
+  <mc:AlternateContent xmlns:mc="http://schemas.openxmlformats.org/markup-compatibility/2006" xmlns:p159="http://schemas.microsoft.com/office/powerpoint/2015/09/main">
+    <mc:Choice Requires="p159">
       <p:transition xmlns:p14="http://schemas.microsoft.com/office/powerpoint/2010/main" spd="med" p14:dur="700">
         <p159:morph option="byObject"/>
       </p:transition>
     </mc:Choice>
-    <mc:Fallback>
+    <mc:Fallback xmlns="">
       <p:transition spd="med">
         <p:fade/>
       </p:transition>
@@ -10092,24 +10089,96 @@
                                   </p:childTnLst>
                                 </p:cTn>
                               </p:par>
-                            </p:childTnLst>
-                          </p:cTn>
-                        </p:par>
-                        <p:par>
-                          <p:cTn id="14" fill="hold">
-                            <p:stCondLst>
-                              <p:cond delay="500"/>
-                            </p:stCondLst>
-                            <p:childTnLst>
                               <p:par>
-                                <p:cTn id="15" presetID="42" presetClass="entr" presetSubtype="0" fill="hold" nodeType="afterEffect">
+                                <p:cTn id="14" presetID="42" presetClass="entr" presetSubtype="0" fill="hold" nodeType="withEffect">
                                   <p:stCondLst>
-                                    <p:cond delay="0"/>
+                                    <p:cond delay="200"/>
                                   </p:stCondLst>
                                   <p:childTnLst>
                                     <p:set>
                                       <p:cBhvr>
-                                        <p:cTn id="16" dur="1" fill="hold">
+                                        <p:cTn id="15" dur="1" fill="hold">
+                                          <p:stCondLst>
+                                            <p:cond delay="0"/>
+                                          </p:stCondLst>
+                                        </p:cTn>
+                                        <p:tgtEl>
+                                          <p:spTgt spid="43"/>
+                                        </p:tgtEl>
+                                        <p:attrNameLst>
+                                          <p:attrName>style.visibility</p:attrName>
+                                        </p:attrNameLst>
+                                      </p:cBhvr>
+                                      <p:to>
+                                        <p:strVal val="visible"/>
+                                      </p:to>
+                                    </p:set>
+                                    <p:animEffect transition="in" filter="fade">
+                                      <p:cBhvr>
+                                        <p:cTn id="16" dur="500"/>
+                                        <p:tgtEl>
+                                          <p:spTgt spid="43"/>
+                                        </p:tgtEl>
+                                      </p:cBhvr>
+                                    </p:animEffect>
+                                    <p:anim calcmode="lin" valueType="num">
+                                      <p:cBhvr>
+                                        <p:cTn id="17" dur="500" fill="hold"/>
+                                        <p:tgtEl>
+                                          <p:spTgt spid="43"/>
+                                        </p:tgtEl>
+                                        <p:attrNameLst>
+                                          <p:attrName>ppt_x</p:attrName>
+                                        </p:attrNameLst>
+                                      </p:cBhvr>
+                                      <p:tavLst>
+                                        <p:tav tm="0">
+                                          <p:val>
+                                            <p:strVal val="#ppt_x"/>
+                                          </p:val>
+                                        </p:tav>
+                                        <p:tav tm="100000">
+                                          <p:val>
+                                            <p:strVal val="#ppt_x"/>
+                                          </p:val>
+                                        </p:tav>
+                                      </p:tavLst>
+                                    </p:anim>
+                                    <p:anim calcmode="lin" valueType="num">
+                                      <p:cBhvr>
+                                        <p:cTn id="18" dur="500" fill="hold"/>
+                                        <p:tgtEl>
+                                          <p:spTgt spid="43"/>
+                                        </p:tgtEl>
+                                        <p:attrNameLst>
+                                          <p:attrName>ppt_y</p:attrName>
+                                        </p:attrNameLst>
+                                      </p:cBhvr>
+                                      <p:tavLst>
+                                        <p:tav tm="0">
+                                          <p:val>
+                                            <p:strVal val="#ppt_y+.1"/>
+                                          </p:val>
+                                        </p:tav>
+                                        <p:tav tm="100000">
+                                          <p:val>
+                                            <p:strVal val="#ppt_y"/>
+                                          </p:val>
+                                        </p:tav>
+                                      </p:tavLst>
+                                    </p:anim>
+                                  </p:childTnLst>
+                                </p:cTn>
+                              </p:par>
+                              <p:par>
+                                <p:cTn id="19" presetID="42" presetClass="entr" presetSubtype="0" fill="hold" nodeType="withEffect">
+                                  <p:stCondLst>
+                                    <p:cond delay="400"/>
+                                  </p:stCondLst>
+                                  <p:childTnLst>
+                                    <p:set>
+                                      <p:cBhvr>
+                                        <p:cTn id="20" dur="1" fill="hold">
                                           <p:stCondLst>
                                             <p:cond delay="0"/>
                                           </p:stCondLst>
@@ -10127,7 +10196,7 @@
                                     </p:set>
                                     <p:animEffect transition="in" filter="fade">
                                       <p:cBhvr>
-                                        <p:cTn id="17" dur="500"/>
+                                        <p:cTn id="21" dur="500"/>
                                         <p:tgtEl>
                                           <p:spTgt spid="46"/>
                                         </p:tgtEl>
@@ -10135,7 +10204,7 @@
                                     </p:animEffect>
                                     <p:anim calcmode="lin" valueType="num">
                                       <p:cBhvr>
-                                        <p:cTn id="18" dur="500" fill="hold"/>
+                                        <p:cTn id="22" dur="500" fill="hold"/>
                                         <p:tgtEl>
                                           <p:spTgt spid="46"/>
                                         </p:tgtEl>
@@ -10158,99 +10227,9 @@
                                     </p:anim>
                                     <p:anim calcmode="lin" valueType="num">
                                       <p:cBhvr>
-                                        <p:cTn id="19" dur="500" fill="hold"/>
+                                        <p:cTn id="23" dur="500" fill="hold"/>
                                         <p:tgtEl>
                                           <p:spTgt spid="46"/>
-                                        </p:tgtEl>
-                                        <p:attrNameLst>
-                                          <p:attrName>ppt_y</p:attrName>
-                                        </p:attrNameLst>
-                                      </p:cBhvr>
-                                      <p:tavLst>
-                                        <p:tav tm="0">
-                                          <p:val>
-                                            <p:strVal val="#ppt_y+.1"/>
-                                          </p:val>
-                                        </p:tav>
-                                        <p:tav tm="100000">
-                                          <p:val>
-                                            <p:strVal val="#ppt_y"/>
-                                          </p:val>
-                                        </p:tav>
-                                      </p:tavLst>
-                                    </p:anim>
-                                  </p:childTnLst>
-                                </p:cTn>
-                              </p:par>
-                            </p:childTnLst>
-                          </p:cTn>
-                        </p:par>
-                        <p:par>
-                          <p:cTn id="20" fill="hold">
-                            <p:stCondLst>
-                              <p:cond delay="1000"/>
-                            </p:stCondLst>
-                            <p:childTnLst>
-                              <p:par>
-                                <p:cTn id="21" presetID="42" presetClass="entr" presetSubtype="0" fill="hold" nodeType="afterEffect">
-                                  <p:stCondLst>
-                                    <p:cond delay="0"/>
-                                  </p:stCondLst>
-                                  <p:childTnLst>
-                                    <p:set>
-                                      <p:cBhvr>
-                                        <p:cTn id="22" dur="1" fill="hold">
-                                          <p:stCondLst>
-                                            <p:cond delay="0"/>
-                                          </p:stCondLst>
-                                        </p:cTn>
-                                        <p:tgtEl>
-                                          <p:spTgt spid="43"/>
-                                        </p:tgtEl>
-                                        <p:attrNameLst>
-                                          <p:attrName>style.visibility</p:attrName>
-                                        </p:attrNameLst>
-                                      </p:cBhvr>
-                                      <p:to>
-                                        <p:strVal val="visible"/>
-                                      </p:to>
-                                    </p:set>
-                                    <p:animEffect transition="in" filter="fade">
-                                      <p:cBhvr>
-                                        <p:cTn id="23" dur="500"/>
-                                        <p:tgtEl>
-                                          <p:spTgt spid="43"/>
-                                        </p:tgtEl>
-                                      </p:cBhvr>
-                                    </p:animEffect>
-                                    <p:anim calcmode="lin" valueType="num">
-                                      <p:cBhvr>
-                                        <p:cTn id="24" dur="500" fill="hold"/>
-                                        <p:tgtEl>
-                                          <p:spTgt spid="43"/>
-                                        </p:tgtEl>
-                                        <p:attrNameLst>
-                                          <p:attrName>ppt_x</p:attrName>
-                                        </p:attrNameLst>
-                                      </p:cBhvr>
-                                      <p:tavLst>
-                                        <p:tav tm="0">
-                                          <p:val>
-                                            <p:strVal val="#ppt_x"/>
-                                          </p:val>
-                                        </p:tav>
-                                        <p:tav tm="100000">
-                                          <p:val>
-                                            <p:strVal val="#ppt_x"/>
-                                          </p:val>
-                                        </p:tav>
-                                      </p:tavLst>
-                                    </p:anim>
-                                    <p:anim calcmode="lin" valueType="num">
-                                      <p:cBhvr>
-                                        <p:cTn id="25" dur="500" fill="hold"/>
-                                        <p:tgtEl>
-                                          <p:spTgt spid="43"/>
                                         </p:tgtEl>
                                         <p:attrNameLst>
                                           <p:attrName>ppt_y</p:attrName>
@@ -10279,26 +10258,26 @@
                     </p:cTn>
                   </p:par>
                   <p:par>
-                    <p:cTn id="26" fill="hold">
+                    <p:cTn id="24" fill="hold">
                       <p:stCondLst>
                         <p:cond delay="indefinite"/>
                       </p:stCondLst>
                       <p:childTnLst>
                         <p:par>
-                          <p:cTn id="27" fill="hold">
+                          <p:cTn id="25" fill="hold">
                             <p:stCondLst>
                               <p:cond delay="0"/>
                             </p:stCondLst>
                             <p:childTnLst>
                               <p:par>
-                                <p:cTn id="28" presetID="1" presetClass="entr" presetSubtype="0" fill="hold" grpId="0" nodeType="clickEffect">
+                                <p:cTn id="26" presetID="1" presetClass="entr" presetSubtype="0" fill="hold" grpId="0" nodeType="clickEffect">
                                   <p:stCondLst>
                                     <p:cond delay="0"/>
                                   </p:stCondLst>
                                   <p:childTnLst>
                                     <p:set>
                                       <p:cBhvr>
-                                        <p:cTn id="29" dur="1" fill="hold">
+                                        <p:cTn id="27" dur="1" fill="hold">
                                           <p:stCondLst>
                                             <p:cond delay="0"/>
                                           </p:stCondLst>
@@ -10324,26 +10303,26 @@
                     </p:cTn>
                   </p:par>
                   <p:par>
-                    <p:cTn id="30" fill="hold">
+                    <p:cTn id="28" fill="hold">
                       <p:stCondLst>
                         <p:cond delay="indefinite"/>
                       </p:stCondLst>
                       <p:childTnLst>
                         <p:par>
-                          <p:cTn id="31" fill="hold">
+                          <p:cTn id="29" fill="hold">
                             <p:stCondLst>
                               <p:cond delay="0"/>
                             </p:stCondLst>
                             <p:childTnLst>
                               <p:par>
-                                <p:cTn id="32" presetID="42" presetClass="entr" presetSubtype="0" fill="hold" nodeType="clickEffect">
+                                <p:cTn id="30" presetID="42" presetClass="entr" presetSubtype="0" fill="hold" nodeType="clickEffect">
                                   <p:stCondLst>
                                     <p:cond delay="0"/>
                                   </p:stCondLst>
                                   <p:childTnLst>
                                     <p:set>
                                       <p:cBhvr>
-                                        <p:cTn id="33" dur="1" fill="hold">
+                                        <p:cTn id="31" dur="1" fill="hold">
                                           <p:stCondLst>
                                             <p:cond delay="0"/>
                                           </p:stCondLst>
@@ -10361,7 +10340,7 @@
                                     </p:set>
                                     <p:animEffect transition="in" filter="fade">
                                       <p:cBhvr>
-                                        <p:cTn id="34" dur="500"/>
+                                        <p:cTn id="32" dur="500"/>
                                         <p:tgtEl>
                                           <p:spTgt spid="31"/>
                                         </p:tgtEl>
@@ -10369,7 +10348,7 @@
                                     </p:animEffect>
                                     <p:anim calcmode="lin" valueType="num">
                                       <p:cBhvr>
-                                        <p:cTn id="35" dur="500" fill="hold"/>
+                                        <p:cTn id="33" dur="500" fill="hold"/>
                                         <p:tgtEl>
                                           <p:spTgt spid="31"/>
                                         </p:tgtEl>
@@ -10392,7 +10371,7 @@
                                     </p:anim>
                                     <p:anim calcmode="lin" valueType="num">
                                       <p:cBhvr>
-                                        <p:cTn id="36" dur="500" fill="hold"/>
+                                        <p:cTn id="34" dur="500" fill="hold"/>
                                         <p:tgtEl>
                                           <p:spTgt spid="31"/>
                                         </p:tgtEl>
@@ -10416,24 +10395,15 @@
                                   </p:childTnLst>
                                 </p:cTn>
                               </p:par>
-                            </p:childTnLst>
-                          </p:cTn>
-                        </p:par>
-                        <p:par>
-                          <p:cTn id="37" fill="hold">
-                            <p:stCondLst>
-                              <p:cond delay="500"/>
-                            </p:stCondLst>
-                            <p:childTnLst>
                               <p:par>
-                                <p:cTn id="38" presetID="42" presetClass="entr" presetSubtype="0" fill="hold" nodeType="afterEffect">
+                                <p:cTn id="35" presetID="42" presetClass="entr" presetSubtype="0" fill="hold" nodeType="withEffect">
                                   <p:stCondLst>
-                                    <p:cond delay="0"/>
+                                    <p:cond delay="200"/>
                                   </p:stCondLst>
                                   <p:childTnLst>
                                     <p:set>
                                       <p:cBhvr>
-                                        <p:cTn id="39" dur="1" fill="hold">
+                                        <p:cTn id="36" dur="1" fill="hold">
                                           <p:stCondLst>
                                             <p:cond delay="0"/>
                                           </p:stCondLst>
@@ -10451,7 +10421,7 @@
                                     </p:set>
                                     <p:animEffect transition="in" filter="fade">
                                       <p:cBhvr>
-                                        <p:cTn id="40" dur="500"/>
+                                        <p:cTn id="37" dur="500"/>
                                         <p:tgtEl>
                                           <p:spTgt spid="34"/>
                                         </p:tgtEl>
@@ -10459,7 +10429,7 @@
                                     </p:animEffect>
                                     <p:anim calcmode="lin" valueType="num">
                                       <p:cBhvr>
-                                        <p:cTn id="41" dur="500" fill="hold"/>
+                                        <p:cTn id="38" dur="500" fill="hold"/>
                                         <p:tgtEl>
                                           <p:spTgt spid="34"/>
                                         </p:tgtEl>
@@ -10482,7 +10452,7 @@
                                     </p:anim>
                                     <p:anim calcmode="lin" valueType="num">
                                       <p:cBhvr>
-                                        <p:cTn id="42" dur="500" fill="hold"/>
+                                        <p:cTn id="39" dur="500" fill="hold"/>
                                         <p:tgtEl>
                                           <p:spTgt spid="34"/>
                                         </p:tgtEl>
@@ -10513,26 +10483,26 @@
                     </p:cTn>
                   </p:par>
                   <p:par>
-                    <p:cTn id="43" fill="hold">
+                    <p:cTn id="40" fill="hold">
                       <p:stCondLst>
                         <p:cond delay="indefinite"/>
                       </p:stCondLst>
                       <p:childTnLst>
                         <p:par>
-                          <p:cTn id="44" fill="hold">
+                          <p:cTn id="41" fill="hold">
                             <p:stCondLst>
                               <p:cond delay="0"/>
                             </p:stCondLst>
                             <p:childTnLst>
                               <p:par>
-                                <p:cTn id="45" presetID="1" presetClass="entr" presetSubtype="0" fill="hold" grpId="0" nodeType="clickEffect">
+                                <p:cTn id="42" presetID="1" presetClass="entr" presetSubtype="0" fill="hold" grpId="0" nodeType="clickEffect">
                                   <p:stCondLst>
                                     <p:cond delay="0"/>
                                   </p:stCondLst>
                                   <p:childTnLst>
                                     <p:set>
                                       <p:cBhvr>
-                                        <p:cTn id="46" dur="1" fill="hold">
+                                        <p:cTn id="43" dur="1" fill="hold">
                                           <p:stCondLst>
                                             <p:cond delay="0"/>
                                           </p:stCondLst>
@@ -10558,26 +10528,26 @@
                     </p:cTn>
                   </p:par>
                   <p:par>
-                    <p:cTn id="47" fill="hold">
+                    <p:cTn id="44" fill="hold">
                       <p:stCondLst>
                         <p:cond delay="indefinite"/>
                       </p:stCondLst>
                       <p:childTnLst>
                         <p:par>
-                          <p:cTn id="48" fill="hold">
+                          <p:cTn id="45" fill="hold">
                             <p:stCondLst>
                               <p:cond delay="0"/>
                             </p:stCondLst>
                             <p:childTnLst>
                               <p:par>
-                                <p:cTn id="49" presetID="42" presetClass="entr" presetSubtype="0" fill="hold" nodeType="clickEffect">
+                                <p:cTn id="46" presetID="42" presetClass="entr" presetSubtype="0" fill="hold" nodeType="clickEffect">
                                   <p:stCondLst>
                                     <p:cond delay="0"/>
                                   </p:stCondLst>
                                   <p:childTnLst>
                                     <p:set>
                                       <p:cBhvr>
-                                        <p:cTn id="50" dur="1" fill="hold">
+                                        <p:cTn id="47" dur="1" fill="hold">
                                           <p:stCondLst>
                                             <p:cond delay="0"/>
                                           </p:stCondLst>
@@ -10595,7 +10565,7 @@
                                     </p:set>
                                     <p:animEffect transition="in" filter="fade">
                                       <p:cBhvr>
-                                        <p:cTn id="51" dur="500"/>
+                                        <p:cTn id="48" dur="500"/>
                                         <p:tgtEl>
                                           <p:spTgt spid="24"/>
                                         </p:tgtEl>
@@ -10603,7 +10573,7 @@
                                     </p:animEffect>
                                     <p:anim calcmode="lin" valueType="num">
                                       <p:cBhvr>
-                                        <p:cTn id="52" dur="500" fill="hold"/>
+                                        <p:cTn id="49" dur="500" fill="hold"/>
                                         <p:tgtEl>
                                           <p:spTgt spid="24"/>
                                         </p:tgtEl>
@@ -10626,7 +10596,7 @@
                                     </p:anim>
                                     <p:anim calcmode="lin" valueType="num">
                                       <p:cBhvr>
-                                        <p:cTn id="53" dur="500" fill="hold"/>
+                                        <p:cTn id="50" dur="500" fill="hold"/>
                                         <p:tgtEl>
                                           <p:spTgt spid="24"/>
                                         </p:tgtEl>
@@ -10650,24 +10620,15 @@
                                   </p:childTnLst>
                                 </p:cTn>
                               </p:par>
-                            </p:childTnLst>
-                          </p:cTn>
-                        </p:par>
-                        <p:par>
-                          <p:cTn id="54" fill="hold">
-                            <p:stCondLst>
-                              <p:cond delay="500"/>
-                            </p:stCondLst>
-                            <p:childTnLst>
                               <p:par>
-                                <p:cTn id="55" presetID="42" presetClass="entr" presetSubtype="0" fill="hold" nodeType="afterEffect">
+                                <p:cTn id="51" presetID="42" presetClass="entr" presetSubtype="0" fill="hold" nodeType="withEffect">
                                   <p:stCondLst>
-                                    <p:cond delay="0"/>
+                                    <p:cond delay="200"/>
                                   </p:stCondLst>
                                   <p:childTnLst>
                                     <p:set>
                                       <p:cBhvr>
-                                        <p:cTn id="56" dur="1" fill="hold">
+                                        <p:cTn id="52" dur="1" fill="hold">
                                           <p:stCondLst>
                                             <p:cond delay="0"/>
                                           </p:stCondLst>
@@ -10685,7 +10646,7 @@
                                     </p:set>
                                     <p:animEffect transition="in" filter="fade">
                                       <p:cBhvr>
-                                        <p:cTn id="57" dur="500"/>
+                                        <p:cTn id="53" dur="500"/>
                                         <p:tgtEl>
                                           <p:spTgt spid="25"/>
                                         </p:tgtEl>
@@ -10693,7 +10654,7 @@
                                     </p:animEffect>
                                     <p:anim calcmode="lin" valueType="num">
                                       <p:cBhvr>
-                                        <p:cTn id="58" dur="500" fill="hold"/>
+                                        <p:cTn id="54" dur="500" fill="hold"/>
                                         <p:tgtEl>
                                           <p:spTgt spid="25"/>
                                         </p:tgtEl>
@@ -10716,7 +10677,7 @@
                                     </p:anim>
                                     <p:anim calcmode="lin" valueType="num">
                                       <p:cBhvr>
-                                        <p:cTn id="59" dur="500" fill="hold"/>
+                                        <p:cTn id="55" dur="500" fill="hold"/>
                                         <p:tgtEl>
                                           <p:spTgt spid="25"/>
                                         </p:tgtEl>
@@ -10740,24 +10701,15 @@
                                   </p:childTnLst>
                                 </p:cTn>
                               </p:par>
-                            </p:childTnLst>
-                          </p:cTn>
-                        </p:par>
-                        <p:par>
-                          <p:cTn id="60" fill="hold">
-                            <p:stCondLst>
-                              <p:cond delay="1000"/>
-                            </p:stCondLst>
-                            <p:childTnLst>
                               <p:par>
-                                <p:cTn id="61" presetID="42" presetClass="entr" presetSubtype="0" fill="hold" nodeType="afterEffect">
+                                <p:cTn id="56" presetID="42" presetClass="entr" presetSubtype="0" fill="hold" nodeType="withEffect">
                                   <p:stCondLst>
-                                    <p:cond delay="0"/>
+                                    <p:cond delay="400"/>
                                   </p:stCondLst>
                                   <p:childTnLst>
                                     <p:set>
                                       <p:cBhvr>
-                                        <p:cTn id="62" dur="1" fill="hold">
+                                        <p:cTn id="57" dur="1" fill="hold">
                                           <p:stCondLst>
                                             <p:cond delay="0"/>
                                           </p:stCondLst>
@@ -10775,7 +10727,7 @@
                                     </p:set>
                                     <p:animEffect transition="in" filter="fade">
                                       <p:cBhvr>
-                                        <p:cTn id="63" dur="500"/>
+                                        <p:cTn id="58" dur="500"/>
                                         <p:tgtEl>
                                           <p:spTgt spid="28"/>
                                         </p:tgtEl>
@@ -10783,7 +10735,7 @@
                                     </p:animEffect>
                                     <p:anim calcmode="lin" valueType="num">
                                       <p:cBhvr>
-                                        <p:cTn id="64" dur="500" fill="hold"/>
+                                        <p:cTn id="59" dur="500" fill="hold"/>
                                         <p:tgtEl>
                                           <p:spTgt spid="28"/>
                                         </p:tgtEl>
@@ -10806,7 +10758,7 @@
                                     </p:anim>
                                     <p:anim calcmode="lin" valueType="num">
                                       <p:cBhvr>
-                                        <p:cTn id="65" dur="500" fill="hold"/>
+                                        <p:cTn id="60" dur="500" fill="hold"/>
                                         <p:tgtEl>
                                           <p:spTgt spid="28"/>
                                         </p:tgtEl>
@@ -10837,26 +10789,26 @@
                     </p:cTn>
                   </p:par>
                   <p:par>
-                    <p:cTn id="66" fill="hold">
+                    <p:cTn id="61" fill="hold">
                       <p:stCondLst>
                         <p:cond delay="indefinite"/>
                       </p:stCondLst>
                       <p:childTnLst>
                         <p:par>
-                          <p:cTn id="67" fill="hold">
+                          <p:cTn id="62" fill="hold">
                             <p:stCondLst>
                               <p:cond delay="0"/>
                             </p:stCondLst>
                             <p:childTnLst>
                               <p:par>
-                                <p:cTn id="68" presetID="1" presetClass="entr" presetSubtype="0" fill="hold" nodeType="clickEffect">
+                                <p:cTn id="63" presetID="1" presetClass="entr" presetSubtype="0" fill="hold" nodeType="clickEffect">
                                   <p:stCondLst>
                                     <p:cond delay="0"/>
                                   </p:stCondLst>
                                   <p:childTnLst>
                                     <p:set>
                                       <p:cBhvr>
-                                        <p:cTn id="69" dur="1" fill="hold">
+                                        <p:cTn id="64" dur="1" fill="hold">
                                           <p:stCondLst>
                                             <p:cond delay="0"/>
                                           </p:stCondLst>
@@ -10987,7 +10939,7 @@
           <a:p>
             <a:fld id="{60CB520D-D965-46BA-A3CC-319C6DE058D5}" type="datetime1">
               <a:rPr lang="de-DE" smtClean="0"/>
-              <a:t>10.06.2025</a:t>
+              <a:t>11.06.2025</a:t>
             </a:fld>
             <a:endParaRPr lang="en-SE"/>
           </a:p>
@@ -12399,13 +12351,13 @@
   <p:clrMapOvr>
     <a:masterClrMapping/>
   </p:clrMapOvr>
-  <mc:AlternateContent xmlns:mc="http://schemas.openxmlformats.org/markup-compatibility/2006">
-    <mc:Choice xmlns:p159="http://schemas.microsoft.com/office/powerpoint/2015/09/main" Requires="p159">
+  <mc:AlternateContent xmlns:mc="http://schemas.openxmlformats.org/markup-compatibility/2006" xmlns:p159="http://schemas.microsoft.com/office/powerpoint/2015/09/main">
+    <mc:Choice Requires="p159">
       <p:transition xmlns:p14="http://schemas.microsoft.com/office/powerpoint/2010/main" spd="med" p14:dur="700">
         <p159:morph option="byObject"/>
       </p:transition>
     </mc:Choice>
-    <mc:Fallback>
+    <mc:Fallback xmlns="">
       <p:transition spd="med">
         <p:fade/>
       </p:transition>
@@ -12779,7 +12731,7 @@
           <a:p>
             <a:fld id="{60CB520D-D965-46BA-A3CC-319C6DE058D5}" type="datetime1">
               <a:rPr lang="de-DE" smtClean="0"/>
-              <a:t>10.06.2025</a:t>
+              <a:t>11.06.2025</a:t>
             </a:fld>
             <a:endParaRPr lang="en-SE"/>
           </a:p>
@@ -14408,13 +14360,13 @@
   <p:clrMapOvr>
     <a:masterClrMapping/>
   </p:clrMapOvr>
-  <mc:AlternateContent xmlns:mc="http://schemas.openxmlformats.org/markup-compatibility/2006">
-    <mc:Choice xmlns:p159="http://schemas.microsoft.com/office/powerpoint/2015/09/main" Requires="p159">
+  <mc:AlternateContent xmlns:mc="http://schemas.openxmlformats.org/markup-compatibility/2006" xmlns:p159="http://schemas.microsoft.com/office/powerpoint/2015/09/main">
+    <mc:Choice Requires="p159">
       <p:transition xmlns:p14="http://schemas.microsoft.com/office/powerpoint/2010/main" spd="med" p14:dur="700">
         <p159:morph option="byObject"/>
       </p:transition>
     </mc:Choice>
-    <mc:Fallback>
+    <mc:Fallback xmlns="">
       <p:transition spd="med">
         <p:fade/>
       </p:transition>
@@ -15083,7 +15035,7 @@
           <a:p>
             <a:fld id="{2509DF91-04BD-4F03-AD3C-3B3EE79DBBA8}" type="datetime1">
               <a:rPr lang="de-DE" smtClean="0"/>
-              <a:t>10.06.2025</a:t>
+              <a:t>11.06.2025</a:t>
             </a:fld>
             <a:endParaRPr lang="en-SE"/>
           </a:p>
@@ -15613,13 +15565,13 @@
   <p:clrMapOvr>
     <a:masterClrMapping/>
   </p:clrMapOvr>
-  <mc:AlternateContent xmlns:mc="http://schemas.openxmlformats.org/markup-compatibility/2006">
-    <mc:Choice xmlns:p159="http://schemas.microsoft.com/office/powerpoint/2015/09/main" Requires="p159">
+  <mc:AlternateContent xmlns:mc="http://schemas.openxmlformats.org/markup-compatibility/2006" xmlns:p159="http://schemas.microsoft.com/office/powerpoint/2015/09/main">
+    <mc:Choice Requires="p159">
       <p:transition xmlns:p14="http://schemas.microsoft.com/office/powerpoint/2010/main" spd="med" p14:dur="700">
         <p159:morph option="byObject"/>
       </p:transition>
     </mc:Choice>
-    <mc:Fallback>
+    <mc:Fallback xmlns="">
       <p:transition spd="med">
         <p:fade/>
       </p:transition>
@@ -16166,7 +16118,7 @@
           <a:p>
             <a:fld id="{7D4C7CFC-0D51-4D10-BD17-755824AADAEC}" type="datetime1">
               <a:rPr lang="de-DE" smtClean="0"/>
-              <a:t>10.06.2025</a:t>
+              <a:t>11.06.2025</a:t>
             </a:fld>
             <a:endParaRPr lang="en-SE"/>
           </a:p>
@@ -16549,13 +16501,13 @@
   <p:clrMapOvr>
     <a:masterClrMapping/>
   </p:clrMapOvr>
-  <mc:AlternateContent xmlns:mc="http://schemas.openxmlformats.org/markup-compatibility/2006">
-    <mc:Choice xmlns:p159="http://schemas.microsoft.com/office/powerpoint/2015/09/main" Requires="p159">
+  <mc:AlternateContent xmlns:mc="http://schemas.openxmlformats.org/markup-compatibility/2006" xmlns:p159="http://schemas.microsoft.com/office/powerpoint/2015/09/main">
+    <mc:Choice Requires="p159">
       <p:transition xmlns:p14="http://schemas.microsoft.com/office/powerpoint/2010/main" spd="med" p14:dur="700">
         <p159:morph option="byObject"/>
       </p:transition>
     </mc:Choice>
-    <mc:Fallback>
+    <mc:Fallback xmlns="">
       <p:transition spd="med">
         <p:fade/>
       </p:transition>

</xml_diff>